<commit_message>
scripts tentantivas de minimize. scripts de geracao de gráficos do problema. scripts de ajuste de custo e constraint.
</commit_message>
<xml_diff>
--- a/rep/methodologies.pptx
+++ b/rep/methodologies.pptx
@@ -10,6 +10,7 @@
     <p:sldId id="258" r:id="rId4"/>
     <p:sldId id="259" r:id="rId5"/>
     <p:sldId id="260" r:id="rId6"/>
+    <p:sldId id="261" r:id="rId7"/>
   </p:sldIdLst>
   <p:sldSz cx="12192000" cy="6858000"/>
   <p:notesSz cx="6858000" cy="9144000"/>
@@ -263,7 +264,7 @@
           <a:p>
             <a:fld id="{D98A4077-0080-499F-A725-DFE57CC016E0}" type="datetimeFigureOut">
               <a:rPr lang="pt-BR" smtClean="0"/>
-              <a:t>29/03/2020</a:t>
+              <a:t>03/06/2020</a:t>
             </a:fld>
             <a:endParaRPr lang="pt-BR"/>
           </a:p>
@@ -461,7 +462,7 @@
           <a:p>
             <a:fld id="{D98A4077-0080-499F-A725-DFE57CC016E0}" type="datetimeFigureOut">
               <a:rPr lang="pt-BR" smtClean="0"/>
-              <a:t>29/03/2020</a:t>
+              <a:t>03/06/2020</a:t>
             </a:fld>
             <a:endParaRPr lang="pt-BR"/>
           </a:p>
@@ -669,7 +670,7 @@
           <a:p>
             <a:fld id="{D98A4077-0080-499F-A725-DFE57CC016E0}" type="datetimeFigureOut">
               <a:rPr lang="pt-BR" smtClean="0"/>
-              <a:t>29/03/2020</a:t>
+              <a:t>03/06/2020</a:t>
             </a:fld>
             <a:endParaRPr lang="pt-BR"/>
           </a:p>
@@ -867,7 +868,7 @@
           <a:p>
             <a:fld id="{D98A4077-0080-499F-A725-DFE57CC016E0}" type="datetimeFigureOut">
               <a:rPr lang="pt-BR" smtClean="0"/>
-              <a:t>29/03/2020</a:t>
+              <a:t>03/06/2020</a:t>
             </a:fld>
             <a:endParaRPr lang="pt-BR"/>
           </a:p>
@@ -1142,7 +1143,7 @@
           <a:p>
             <a:fld id="{D98A4077-0080-499F-A725-DFE57CC016E0}" type="datetimeFigureOut">
               <a:rPr lang="pt-BR" smtClean="0"/>
-              <a:t>29/03/2020</a:t>
+              <a:t>03/06/2020</a:t>
             </a:fld>
             <a:endParaRPr lang="pt-BR"/>
           </a:p>
@@ -1407,7 +1408,7 @@
           <a:p>
             <a:fld id="{D98A4077-0080-499F-A725-DFE57CC016E0}" type="datetimeFigureOut">
               <a:rPr lang="pt-BR" smtClean="0"/>
-              <a:t>29/03/2020</a:t>
+              <a:t>03/06/2020</a:t>
             </a:fld>
             <a:endParaRPr lang="pt-BR"/>
           </a:p>
@@ -1819,7 +1820,7 @@
           <a:p>
             <a:fld id="{D98A4077-0080-499F-A725-DFE57CC016E0}" type="datetimeFigureOut">
               <a:rPr lang="pt-BR" smtClean="0"/>
-              <a:t>29/03/2020</a:t>
+              <a:t>03/06/2020</a:t>
             </a:fld>
             <a:endParaRPr lang="pt-BR"/>
           </a:p>
@@ -1960,7 +1961,7 @@
           <a:p>
             <a:fld id="{D98A4077-0080-499F-A725-DFE57CC016E0}" type="datetimeFigureOut">
               <a:rPr lang="pt-BR" smtClean="0"/>
-              <a:t>29/03/2020</a:t>
+              <a:t>03/06/2020</a:t>
             </a:fld>
             <a:endParaRPr lang="pt-BR"/>
           </a:p>
@@ -2073,7 +2074,7 @@
           <a:p>
             <a:fld id="{D98A4077-0080-499F-A725-DFE57CC016E0}" type="datetimeFigureOut">
               <a:rPr lang="pt-BR" smtClean="0"/>
-              <a:t>29/03/2020</a:t>
+              <a:t>03/06/2020</a:t>
             </a:fld>
             <a:endParaRPr lang="pt-BR"/>
           </a:p>
@@ -2384,7 +2385,7 @@
           <a:p>
             <a:fld id="{D98A4077-0080-499F-A725-DFE57CC016E0}" type="datetimeFigureOut">
               <a:rPr lang="pt-BR" smtClean="0"/>
-              <a:t>29/03/2020</a:t>
+              <a:t>03/06/2020</a:t>
             </a:fld>
             <a:endParaRPr lang="pt-BR"/>
           </a:p>
@@ -2672,7 +2673,7 @@
           <a:p>
             <a:fld id="{D98A4077-0080-499F-A725-DFE57CC016E0}" type="datetimeFigureOut">
               <a:rPr lang="pt-BR" smtClean="0"/>
-              <a:t>29/03/2020</a:t>
+              <a:t>03/06/2020</a:t>
             </a:fld>
             <a:endParaRPr lang="pt-BR"/>
           </a:p>
@@ -2913,7 +2914,7 @@
           <a:p>
             <a:fld id="{D98A4077-0080-499F-A725-DFE57CC016E0}" type="datetimeFigureOut">
               <a:rPr lang="pt-BR" smtClean="0"/>
-              <a:t>29/03/2020</a:t>
+              <a:t>03/06/2020</a:t>
             </a:fld>
             <a:endParaRPr lang="pt-BR"/>
           </a:p>
@@ -3755,8 +3756,8 @@
           </a:p>
         </p:txBody>
       </p:sp>
-      <mc:AlternateContent xmlns:mc="http://schemas.openxmlformats.org/markup-compatibility/2006">
-        <mc:Choice xmlns:a14="http://schemas.microsoft.com/office/drawing/2010/main" Requires="a14">
+      <mc:AlternateContent xmlns:mc="http://schemas.openxmlformats.org/markup-compatibility/2006" xmlns:a14="http://schemas.microsoft.com/office/drawing/2010/main">
+        <mc:Choice Requires="a14">
           <p:sp>
             <p:nvSpPr>
               <p:cNvPr id="3" name="Espaço Reservado para Conteúdo 2">
@@ -3991,7 +3992,7 @@
             </p:txBody>
           </p:sp>
         </mc:Choice>
-        <mc:Fallback>
+        <mc:Fallback xmlns="">
           <p:sp>
             <p:nvSpPr>
               <p:cNvPr id="3" name="Espaço Reservado para Conteúdo 2">
@@ -4277,6 +4278,253 @@
     <p:extLst>
       <p:ext uri="{BB962C8B-B14F-4D97-AF65-F5344CB8AC3E}">
         <p14:creationId xmlns:p14="http://schemas.microsoft.com/office/powerpoint/2010/main" val="2529619972"/>
+      </p:ext>
+    </p:extLst>
+  </p:cSld>
+  <p:clrMapOvr>
+    <a:masterClrMapping/>
+  </p:clrMapOvr>
+</p:sld>
+</file>
+
+<file path=ppt/slides/slide6.xml><?xml version="1.0" encoding="utf-8"?>
+<p:sld xmlns:a="http://schemas.openxmlformats.org/drawingml/2006/main" xmlns:r="http://schemas.openxmlformats.org/officeDocument/2006/relationships" xmlns:p="http://schemas.openxmlformats.org/presentationml/2006/main">
+  <p:cSld>
+    <p:spTree>
+      <p:nvGrpSpPr>
+        <p:cNvPr id="1" name=""/>
+        <p:cNvGrpSpPr/>
+        <p:nvPr/>
+      </p:nvGrpSpPr>
+      <p:grpSpPr>
+        <a:xfrm>
+          <a:off x="0" y="0"/>
+          <a:ext cx="0" cy="0"/>
+          <a:chOff x="0" y="0"/>
+          <a:chExt cx="0" cy="0"/>
+        </a:xfrm>
+      </p:grpSpPr>
+      <p:sp>
+        <p:nvSpPr>
+          <p:cNvPr id="2" name="Título 1">
+            <a:extLst>
+              <a:ext uri="{FF2B5EF4-FFF2-40B4-BE49-F238E27FC236}">
+                <a16:creationId xmlns:a16="http://schemas.microsoft.com/office/drawing/2014/main" id="{4ADC5FEF-B2C1-412C-9035-FCA26CFC943D}"/>
+              </a:ext>
+            </a:extLst>
+          </p:cNvPr>
+          <p:cNvSpPr>
+            <a:spLocks noGrp="1"/>
+          </p:cNvSpPr>
+          <p:nvPr>
+            <p:ph type="title"/>
+          </p:nvPr>
+        </p:nvSpPr>
+        <p:spPr/>
+        <p:txBody>
+          <a:bodyPr/>
+          <a:lstStyle/>
+          <a:p>
+            <a:r>
+              <a:rPr lang="en-US" dirty="0"/>
+              <a:t>B&amp;B methodologies</a:t>
+            </a:r>
+          </a:p>
+        </p:txBody>
+      </p:sp>
+      <p:sp>
+        <p:nvSpPr>
+          <p:cNvPr id="3" name="Espaço Reservado para Conteúdo 2">
+            <a:extLst>
+              <a:ext uri="{FF2B5EF4-FFF2-40B4-BE49-F238E27FC236}">
+                <a16:creationId xmlns:a16="http://schemas.microsoft.com/office/drawing/2014/main" id="{FA3BD2C0-CFB8-4EF0-AD84-75C558E015C6}"/>
+              </a:ext>
+            </a:extLst>
+          </p:cNvPr>
+          <p:cNvSpPr>
+            <a:spLocks noGrp="1"/>
+          </p:cNvSpPr>
+          <p:nvPr>
+            <p:ph idx="1"/>
+          </p:nvPr>
+        </p:nvSpPr>
+        <p:spPr/>
+        <p:txBody>
+          <a:bodyPr/>
+          <a:lstStyle/>
+          <a:p>
+            <a:r>
+              <a:rPr lang="en-US" dirty="0"/>
+              <a:t>Full discrete</a:t>
+            </a:r>
+            <a:r>
+              <a:rPr lang="pt-BR" dirty="0"/>
+              <a:t>: </a:t>
+            </a:r>
+            <a:r>
+              <a:rPr lang="pt-BR" dirty="0" err="1"/>
+              <a:t>binary</a:t>
+            </a:r>
+            <a:r>
+              <a:rPr lang="pt-BR" dirty="0"/>
+              <a:t> </a:t>
+            </a:r>
+            <a:r>
+              <a:rPr lang="pt-BR" dirty="0" err="1"/>
+              <a:t>tree</a:t>
+            </a:r>
+            <a:endParaRPr lang="pt-BR" dirty="0"/>
+          </a:p>
+          <a:p>
+            <a:pPr lvl="1"/>
+            <a:r>
+              <a:rPr lang="pt-BR" dirty="0"/>
+              <a:t>...</a:t>
+            </a:r>
+          </a:p>
+          <a:p>
+            <a:r>
+              <a:rPr lang="pt-BR" dirty="0" err="1"/>
+              <a:t>Analytical</a:t>
+            </a:r>
+            <a:r>
+              <a:rPr lang="pt-BR" dirty="0"/>
+              <a:t> approach </a:t>
+            </a:r>
+            <a:r>
+              <a:rPr lang="pt-BR" dirty="0" err="1"/>
+              <a:t>with</a:t>
+            </a:r>
+            <a:r>
+              <a:rPr lang="pt-BR" dirty="0"/>
+              <a:t> </a:t>
+            </a:r>
+            <a:r>
+              <a:rPr lang="pt-BR" dirty="0" err="1"/>
+              <a:t>scipy.optimize.minimize</a:t>
+            </a:r>
+            <a:endParaRPr lang="pt-BR" dirty="0"/>
+          </a:p>
+          <a:p>
+            <a:pPr lvl="1"/>
+            <a:r>
+              <a:rPr lang="pt-BR" dirty="0"/>
+              <a:t>Fit </a:t>
+            </a:r>
+            <a:r>
+              <a:rPr lang="pt-BR" dirty="0" err="1"/>
+              <a:t>catalog</a:t>
+            </a:r>
+            <a:endParaRPr lang="pt-BR" dirty="0"/>
+          </a:p>
+          <a:p>
+            <a:pPr lvl="1"/>
+            <a:r>
+              <a:rPr lang="pt-BR" dirty="0"/>
+              <a:t>Fit </a:t>
+            </a:r>
+            <a:r>
+              <a:rPr lang="pt-BR" dirty="0" err="1"/>
+              <a:t>constrainst</a:t>
+            </a:r>
+            <a:r>
+              <a:rPr lang="pt-BR" dirty="0"/>
+              <a:t> </a:t>
+            </a:r>
+            <a:r>
+              <a:rPr lang="pt-BR" dirty="0" err="1"/>
+              <a:t>is</a:t>
+            </a:r>
+            <a:r>
+              <a:rPr lang="pt-BR" dirty="0"/>
+              <a:t> </a:t>
+            </a:r>
+            <a:r>
+              <a:rPr lang="pt-BR" dirty="0" err="1"/>
+              <a:t>not</a:t>
+            </a:r>
+            <a:r>
+              <a:rPr lang="pt-BR" dirty="0"/>
+              <a:t> </a:t>
+            </a:r>
+            <a:r>
+              <a:rPr lang="pt-BR" dirty="0" err="1"/>
+              <a:t>available</a:t>
+            </a:r>
+            <a:r>
+              <a:rPr lang="pt-BR" dirty="0"/>
+              <a:t>: inviável pois é preciso verificar as restrições de todos os tubos = força bruta</a:t>
+            </a:r>
+          </a:p>
+          <a:p>
+            <a:pPr lvl="1"/>
+            <a:r>
+              <a:rPr lang="pt-BR" dirty="0"/>
+              <a:t>Fit 2 </a:t>
+            </a:r>
+            <a:r>
+              <a:rPr lang="pt-BR" dirty="0" err="1"/>
+              <a:t>tubulars</a:t>
+            </a:r>
+            <a:r>
+              <a:rPr lang="pt-BR" dirty="0"/>
+              <a:t> </a:t>
+            </a:r>
+            <a:r>
+              <a:rPr lang="pt-BR" dirty="0" err="1"/>
+              <a:t>to</a:t>
+            </a:r>
+            <a:r>
+              <a:rPr lang="pt-BR" dirty="0"/>
+              <a:t> </a:t>
+            </a:r>
+            <a:r>
+              <a:rPr lang="pt-BR" dirty="0" err="1"/>
+              <a:t>constraints</a:t>
+            </a:r>
+            <a:r>
+              <a:rPr lang="pt-BR" dirty="0"/>
+              <a:t>: linear approach </a:t>
+            </a:r>
+            <a:r>
+              <a:rPr lang="pt-BR" dirty="0" err="1"/>
+              <a:t>with</a:t>
+            </a:r>
+            <a:r>
+              <a:rPr lang="pt-BR" dirty="0"/>
+              <a:t> </a:t>
+            </a:r>
+            <a:r>
+              <a:rPr lang="pt-BR" dirty="0" err="1"/>
+              <a:t>few</a:t>
+            </a:r>
+            <a:r>
+              <a:rPr lang="pt-BR" dirty="0"/>
+              <a:t> points</a:t>
+            </a:r>
+          </a:p>
+          <a:p>
+            <a:pPr lvl="2"/>
+            <a:r>
+              <a:rPr lang="pt-BR" dirty="0"/>
+              <a:t>É uma abordagem mista: etapa de minimize (com </a:t>
+            </a:r>
+            <a:r>
+              <a:rPr lang="pt-BR" dirty="0" err="1"/>
+              <a:t>fit</a:t>
+            </a:r>
+            <a:r>
+              <a:rPr lang="pt-BR" dirty="0"/>
+              <a:t>) e árvore.</a:t>
+            </a:r>
+            <a:endParaRPr lang="en-US" dirty="0"/>
+          </a:p>
+        </p:txBody>
+      </p:sp>
+    </p:spTree>
+    <p:extLst>
+      <p:ext uri="{BB962C8B-B14F-4D97-AF65-F5344CB8AC3E}">
+        <p14:creationId xmlns:p14="http://schemas.microsoft.com/office/powerpoint/2010/main" val="1428683084"/>
       </p:ext>
     </p:extLst>
   </p:cSld>

</xml_diff>